<commit_message>
Updated with some idea about repository and project
</commit_message>
<xml_diff>
--- a/Git & Github.pptx
+++ b/Git & Github.pptx
@@ -9,6 +9,7 @@
     <p:sldId id="257" r:id="rId3"/>
     <p:sldId id="259" r:id="rId4"/>
     <p:sldId id="260" r:id="rId5"/>
+    <p:sldId id="261" r:id="rId6"/>
   </p:sldIdLst>
   <p:sldSz cx="12192000" cy="6858000"/>
   <p:notesSz cx="6858000" cy="9144000"/>
@@ -306,7 +307,7 @@
           <a:p>
             <a:fld id="{2E5D24D0-6874-418B-B356-0C627D23B869}" type="datetimeFigureOut">
               <a:rPr lang="en-US" smtClean="0"/>
-              <a:t>6/25/2020</a:t>
+              <a:t>7/1/2020</a:t>
             </a:fld>
             <a:endParaRPr lang="en-US"/>
           </a:p>
@@ -747,7 +748,7 @@
           <a:p>
             <a:fld id="{2E5D24D0-6874-418B-B356-0C627D23B869}" type="datetimeFigureOut">
               <a:rPr lang="en-US" smtClean="0"/>
-              <a:t>6/25/2020</a:t>
+              <a:t>7/1/2020</a:t>
             </a:fld>
             <a:endParaRPr lang="en-US"/>
           </a:p>
@@ -997,7 +998,7 @@
           <a:p>
             <a:fld id="{2E5D24D0-6874-418B-B356-0C627D23B869}" type="datetimeFigureOut">
               <a:rPr lang="en-US" smtClean="0"/>
-              <a:t>6/25/2020</a:t>
+              <a:t>7/1/2020</a:t>
             </a:fld>
             <a:endParaRPr lang="en-US"/>
           </a:p>
@@ -1305,7 +1306,7 @@
           <a:p>
             <a:fld id="{2E5D24D0-6874-418B-B356-0C627D23B869}" type="datetimeFigureOut">
               <a:rPr lang="en-US" smtClean="0"/>
-              <a:t>6/25/2020</a:t>
+              <a:t>7/1/2020</a:t>
             </a:fld>
             <a:endParaRPr lang="en-US"/>
           </a:p>
@@ -1623,7 +1624,7 @@
           <a:p>
             <a:fld id="{2E5D24D0-6874-418B-B356-0C627D23B869}" type="datetimeFigureOut">
               <a:rPr lang="en-US" smtClean="0"/>
-              <a:t>6/25/2020</a:t>
+              <a:t>7/1/2020</a:t>
             </a:fld>
             <a:endParaRPr lang="en-US"/>
           </a:p>
@@ -1925,7 +1926,7 @@
           <a:p>
             <a:fld id="{2E5D24D0-6874-418B-B356-0C627D23B869}" type="datetimeFigureOut">
               <a:rPr lang="en-US" smtClean="0"/>
-              <a:t>6/25/2020</a:t>
+              <a:t>7/1/2020</a:t>
             </a:fld>
             <a:endParaRPr lang="en-US"/>
           </a:p>
@@ -2292,7 +2293,7 @@
           <a:p>
             <a:fld id="{2E5D24D0-6874-418B-B356-0C627D23B869}" type="datetimeFigureOut">
               <a:rPr lang="en-US" smtClean="0"/>
-              <a:t>6/25/2020</a:t>
+              <a:t>7/1/2020</a:t>
             </a:fld>
             <a:endParaRPr lang="en-US"/>
           </a:p>
@@ -2466,7 +2467,7 @@
           <a:p>
             <a:fld id="{2E5D24D0-6874-418B-B356-0C627D23B869}" type="datetimeFigureOut">
               <a:rPr lang="en-US" smtClean="0"/>
-              <a:t>6/25/2020</a:t>
+              <a:t>7/1/2020</a:t>
             </a:fld>
             <a:endParaRPr lang="en-US"/>
           </a:p>
@@ -2646,7 +2647,7 @@
           <a:p>
             <a:fld id="{2E5D24D0-6874-418B-B356-0C627D23B869}" type="datetimeFigureOut">
               <a:rPr lang="en-US" smtClean="0"/>
-              <a:t>6/25/2020</a:t>
+              <a:t>7/1/2020</a:t>
             </a:fld>
             <a:endParaRPr lang="en-US"/>
           </a:p>
@@ -2816,7 +2817,7 @@
           <a:p>
             <a:fld id="{2E5D24D0-6874-418B-B356-0C627D23B869}" type="datetimeFigureOut">
               <a:rPr lang="en-US" smtClean="0"/>
-              <a:t>6/25/2020</a:t>
+              <a:t>7/1/2020</a:t>
             </a:fld>
             <a:endParaRPr lang="en-US"/>
           </a:p>
@@ -3066,7 +3067,7 @@
           <a:p>
             <a:fld id="{2E5D24D0-6874-418B-B356-0C627D23B869}" type="datetimeFigureOut">
               <a:rPr lang="en-US" smtClean="0"/>
-              <a:t>6/25/2020</a:t>
+              <a:t>7/1/2020</a:t>
             </a:fld>
             <a:endParaRPr lang="en-US"/>
           </a:p>
@@ -3302,7 +3303,7 @@
           <a:p>
             <a:fld id="{2E5D24D0-6874-418B-B356-0C627D23B869}" type="datetimeFigureOut">
               <a:rPr lang="en-US" smtClean="0"/>
-              <a:t>6/25/2020</a:t>
+              <a:t>7/1/2020</a:t>
             </a:fld>
             <a:endParaRPr lang="en-US"/>
           </a:p>
@@ -3684,7 +3685,7 @@
           <a:p>
             <a:fld id="{2E5D24D0-6874-418B-B356-0C627D23B869}" type="datetimeFigureOut">
               <a:rPr lang="en-US" smtClean="0"/>
-              <a:t>6/25/2020</a:t>
+              <a:t>7/1/2020</a:t>
             </a:fld>
             <a:endParaRPr lang="en-US"/>
           </a:p>
@@ -3802,7 +3803,7 @@
           <a:p>
             <a:fld id="{2E5D24D0-6874-418B-B356-0C627D23B869}" type="datetimeFigureOut">
               <a:rPr lang="en-US" smtClean="0"/>
-              <a:t>6/25/2020</a:t>
+              <a:t>7/1/2020</a:t>
             </a:fld>
             <a:endParaRPr lang="en-US"/>
           </a:p>
@@ -3897,7 +3898,7 @@
           <a:p>
             <a:fld id="{2E5D24D0-6874-418B-B356-0C627D23B869}" type="datetimeFigureOut">
               <a:rPr lang="en-US" smtClean="0"/>
-              <a:t>6/25/2020</a:t>
+              <a:t>7/1/2020</a:t>
             </a:fld>
             <a:endParaRPr lang="en-US"/>
           </a:p>
@@ -4157,7 +4158,7 @@
           <a:p>
             <a:fld id="{2E5D24D0-6874-418B-B356-0C627D23B869}" type="datetimeFigureOut">
               <a:rPr lang="en-US" smtClean="0"/>
-              <a:t>6/25/2020</a:t>
+              <a:t>7/1/2020</a:t>
             </a:fld>
             <a:endParaRPr lang="en-US"/>
           </a:p>
@@ -4445,7 +4446,7 @@
           <a:p>
             <a:fld id="{2E5D24D0-6874-418B-B356-0C627D23B869}" type="datetimeFigureOut">
               <a:rPr lang="en-US" smtClean="0"/>
-              <a:t>6/25/2020</a:t>
+              <a:t>7/1/2020</a:t>
             </a:fld>
             <a:endParaRPr lang="en-US"/>
           </a:p>
@@ -4851,7 +4852,7 @@
           <a:p>
             <a:fld id="{2E5D24D0-6874-418B-B356-0C627D23B869}" type="datetimeFigureOut">
               <a:rPr lang="en-US" smtClean="0"/>
-              <a:t>6/25/2020</a:t>
+              <a:t>7/1/2020</a:t>
             </a:fld>
             <a:endParaRPr lang="en-US"/>
           </a:p>
@@ -6180,6 +6181,226 @@
 </p:sld>
 </file>
 
+<file path=ppt/slides/slide5.xml><?xml version="1.0" encoding="utf-8"?>
+<p:sld xmlns:a="http://schemas.openxmlformats.org/drawingml/2006/main" xmlns:r="http://schemas.openxmlformats.org/officeDocument/2006/relationships" xmlns:p="http://schemas.openxmlformats.org/presentationml/2006/main">
+  <p:cSld>
+    <p:spTree>
+      <p:nvGrpSpPr>
+        <p:cNvPr id="1" name=""/>
+        <p:cNvGrpSpPr/>
+        <p:nvPr/>
+      </p:nvGrpSpPr>
+      <p:grpSpPr>
+        <a:xfrm>
+          <a:off x="0" y="0"/>
+          <a:ext cx="0" cy="0"/>
+          <a:chOff x="0" y="0"/>
+          <a:chExt cx="0" cy="0"/>
+        </a:xfrm>
+      </p:grpSpPr>
+      <p:sp>
+        <p:nvSpPr>
+          <p:cNvPr id="2" name="Title 1">
+            <a:extLst>
+              <a:ext uri="{FF2B5EF4-FFF2-40B4-BE49-F238E27FC236}">
+                <a16:creationId xmlns:a16="http://schemas.microsoft.com/office/drawing/2014/main" id="{36E5DCD4-D358-497D-B357-DEADECC52B4C}"/>
+              </a:ext>
+            </a:extLst>
+          </p:cNvPr>
+          <p:cNvSpPr>
+            <a:spLocks noGrp="1"/>
+          </p:cNvSpPr>
+          <p:nvPr>
+            <p:ph type="title"/>
+          </p:nvPr>
+        </p:nvSpPr>
+        <p:spPr>
+          <a:xfrm>
+            <a:off x="1452841" y="21535"/>
+            <a:ext cx="7280343" cy="930965"/>
+          </a:xfrm>
+        </p:spPr>
+        <p:txBody>
+          <a:bodyPr>
+            <a:normAutofit fontScale="90000"/>
+          </a:bodyPr>
+          <a:lstStyle/>
+          <a:p>
+            <a:r>
+              <a:rPr lang="en-US" dirty="0" err="1">
+                <a:latin typeface="Eras Bold ITC" panose="020B0907030504020204" pitchFamily="34" charset="0"/>
+              </a:rPr>
+              <a:t>Github</a:t>
+            </a:r>
+            <a:r>
+              <a:rPr lang="en-US" dirty="0">
+                <a:latin typeface="Eras Bold ITC" panose="020B0907030504020204" pitchFamily="34" charset="0"/>
+              </a:rPr>
+              <a:t> Repository &amp; project</a:t>
+            </a:r>
+          </a:p>
+        </p:txBody>
+      </p:sp>
+      <p:sp>
+        <p:nvSpPr>
+          <p:cNvPr id="3" name="Content Placeholder 2">
+            <a:extLst>
+              <a:ext uri="{FF2B5EF4-FFF2-40B4-BE49-F238E27FC236}">
+                <a16:creationId xmlns:a16="http://schemas.microsoft.com/office/drawing/2014/main" id="{055CB7AF-CFE4-4285-B5F4-5842BD6956FA}"/>
+              </a:ext>
+            </a:extLst>
+          </p:cNvPr>
+          <p:cNvSpPr>
+            <a:spLocks noGrp="1"/>
+          </p:cNvSpPr>
+          <p:nvPr>
+            <p:ph idx="1"/>
+          </p:nvPr>
+        </p:nvSpPr>
+        <p:spPr>
+          <a:xfrm>
+            <a:off x="134783" y="899492"/>
+            <a:ext cx="5822602" cy="4759186"/>
+          </a:xfrm>
+        </p:spPr>
+        <p:txBody>
+          <a:bodyPr>
+            <a:normAutofit/>
+          </a:bodyPr>
+          <a:lstStyle/>
+          <a:p>
+            <a:pPr marL="0" indent="0" algn="just">
+              <a:buNone/>
+            </a:pPr>
+            <a:r>
+              <a:rPr lang="en-US" sz="2400" b="1" dirty="0">
+                <a:solidFill>
+                  <a:srgbClr val="002060"/>
+                </a:solidFill>
+              </a:rPr>
+              <a:t>Repository : </a:t>
+            </a:r>
+            <a:r>
+              <a:rPr lang="en-US" sz="2400" dirty="0">
+                <a:solidFill>
+                  <a:schemeClr val="bg1"/>
+                </a:solidFill>
+                <a:latin typeface="Times New Roman" panose="02020603050405020304" pitchFamily="18" charset="0"/>
+                <a:cs typeface="Times New Roman" panose="02020603050405020304" pitchFamily="18" charset="0"/>
+              </a:rPr>
+              <a:t>GitHub repositories are where we store code. We create a repository then we can connect our local git repository to that remote repository and push up changes, created branches, and share our code with our team.</a:t>
+            </a:r>
+            <a:endParaRPr lang="en-US" sz="2400" dirty="0"/>
+          </a:p>
+          <a:p>
+            <a:pPr marL="0" indent="0" algn="just">
+              <a:buNone/>
+            </a:pPr>
+            <a:r>
+              <a:rPr lang="en-US" sz="2400" b="1" dirty="0">
+                <a:solidFill>
+                  <a:srgbClr val="002060"/>
+                </a:solidFill>
+              </a:rPr>
+              <a:t>Project : </a:t>
+            </a:r>
+            <a:r>
+              <a:rPr lang="en-US" sz="2400" dirty="0">
+                <a:solidFill>
+                  <a:schemeClr val="bg1"/>
+                </a:solidFill>
+                <a:latin typeface="Times New Roman" panose="02020603050405020304" pitchFamily="18" charset="0"/>
+                <a:cs typeface="Times New Roman" panose="02020603050405020304" pitchFamily="18" charset="0"/>
+              </a:rPr>
+              <a:t>A GitHub project is a place to track issues, features, and other tasks related to the code in the repository. We can also connect up with a DevOps build and deploy process, assign people to tasks, and so forth.</a:t>
+            </a:r>
+          </a:p>
+        </p:txBody>
+      </p:sp>
+      <p:pic>
+        <p:nvPicPr>
+          <p:cNvPr id="7" name="Picture 6">
+            <a:extLst>
+              <a:ext uri="{FF2B5EF4-FFF2-40B4-BE49-F238E27FC236}">
+                <a16:creationId xmlns:a16="http://schemas.microsoft.com/office/drawing/2014/main" id="{EF8C88D3-85C8-4EC1-A1EA-2A16C156FED2}"/>
+              </a:ext>
+            </a:extLst>
+          </p:cNvPr>
+          <p:cNvPicPr>
+            <a:picLocks noChangeAspect="1"/>
+          </p:cNvPicPr>
+          <p:nvPr/>
+        </p:nvPicPr>
+        <p:blipFill>
+          <a:blip r:embed="rId2">
+            <a:extLst>
+              <a:ext uri="{28A0092B-C50C-407E-A947-70E740481C1C}">
+                <a14:useLocalDpi xmlns:a14="http://schemas.microsoft.com/office/drawing/2010/main" val="0"/>
+              </a:ext>
+            </a:extLst>
+          </a:blip>
+          <a:stretch>
+            <a:fillRect/>
+          </a:stretch>
+        </p:blipFill>
+        <p:spPr>
+          <a:xfrm>
+            <a:off x="6234615" y="952500"/>
+            <a:ext cx="5822602" cy="5779604"/>
+          </a:xfrm>
+          <a:prstGeom prst="rect">
+            <a:avLst/>
+          </a:prstGeom>
+        </p:spPr>
+      </p:pic>
+      <p:sp>
+        <p:nvSpPr>
+          <p:cNvPr id="8" name="TextBox 7">
+            <a:extLst>
+              <a:ext uri="{FF2B5EF4-FFF2-40B4-BE49-F238E27FC236}">
+                <a16:creationId xmlns:a16="http://schemas.microsoft.com/office/drawing/2014/main" id="{8CF4486C-B20F-4B1A-87CE-E7925393D773}"/>
+              </a:ext>
+            </a:extLst>
+          </p:cNvPr>
+          <p:cNvSpPr txBox="1"/>
+          <p:nvPr/>
+        </p:nvSpPr>
+        <p:spPr>
+          <a:xfrm>
+            <a:off x="369145" y="5666120"/>
+            <a:ext cx="5117255" cy="584775"/>
+          </a:xfrm>
+          <a:prstGeom prst="rect">
+            <a:avLst/>
+          </a:prstGeom>
+          <a:noFill/>
+        </p:spPr>
+        <p:txBody>
+          <a:bodyPr wrap="square" rtlCol="0">
+            <a:spAutoFit/>
+          </a:bodyPr>
+          <a:lstStyle/>
+          <a:p>
+            <a:r>
+              <a:rPr lang="en-US" sz="1600" dirty="0"/>
+              <a:t>In the picture Learning-Periods is a repository and 1 project is created in the repository.</a:t>
+            </a:r>
+          </a:p>
+        </p:txBody>
+      </p:sp>
+    </p:spTree>
+    <p:extLst>
+      <p:ext uri="{BB962C8B-B14F-4D97-AF65-F5344CB8AC3E}">
+        <p14:creationId xmlns:p14="http://schemas.microsoft.com/office/powerpoint/2010/main" val="3324480551"/>
+      </p:ext>
+    </p:extLst>
+  </p:cSld>
+  <p:clrMapOvr>
+    <a:masterClrMapping/>
+  </p:clrMapOvr>
+</p:sld>
+</file>
+
 <file path=ppt/theme/theme1.xml><?xml version="1.0" encoding="utf-8"?>
 <a:theme xmlns:a="http://schemas.openxmlformats.org/drawingml/2006/main" name="Slice">
   <a:themeElements>

</xml_diff>